<commit_message>
Adding troubleshooting, hygiene and FAQ
</commit_message>
<xml_diff>
--- a/Meta/Other/Presentation (Sv).pptx
+++ b/Meta/Other/Presentation (Sv).pptx
@@ -25143,7 +25143,7 @@
                 </a:r>
                 <a:r>
                   <a:rPr lang="sv-SE" sz="1050" dirty="0" err="1"/>
-                  <a:t>BiLevel</a:t>
+                  <a:t>BiPAP</a:t>
                 </a:r>
                 <a:endParaRPr lang="sv-SE" sz="1050" dirty="0"/>
               </a:p>
@@ -26197,7 +26197,7 @@
                 </a:r>
                 <a:r>
                   <a:rPr lang="sv-SE" sz="1050" dirty="0" err="1"/>
-                  <a:t>BiLevel</a:t>
+                  <a:t>BiPAP</a:t>
                 </a:r>
                 <a:endParaRPr lang="sv-SE" sz="1050" dirty="0"/>
               </a:p>
@@ -27825,9 +27825,10 @@
             <a:p>
               <a:pPr algn="ctr"/>
               <a:r>
-                <a:rPr lang="sv-SE" sz="1050" dirty="0"/>
-                <a:t>Flaska</a:t>
+                <a:rPr lang="sv-SE" sz="1050" dirty="0" err="1"/>
+                <a:t>Bottle</a:t>
               </a:r>
+              <a:endParaRPr lang="sv-SE" sz="1050" dirty="0"/>
             </a:p>
           </p:txBody>
         </p:sp>
@@ -27882,9 +27883,10 @@
             <a:p>
               <a:pPr algn="ctr"/>
               <a:r>
-                <a:rPr lang="sv-SE" sz="1050" dirty="0"/>
-                <a:t>Flaska</a:t>
+                <a:rPr lang="sv-SE" sz="1050" dirty="0" err="1"/>
+                <a:t>Bottle</a:t>
               </a:r>
+              <a:endParaRPr lang="sv-SE" sz="1050" dirty="0"/>
             </a:p>
           </p:txBody>
         </p:sp>
@@ -28558,6 +28560,12 @@
 </file>
 
 <file path=customXml/item1.xml><?xml version="1.0" encoding="utf-8"?>
+<p:properties xmlns:p="http://schemas.microsoft.com/office/2006/metadata/properties" xmlns:xsi="http://www.w3.org/2001/XMLSchema-instance" xmlns:pc="http://schemas.microsoft.com/office/infopath/2007/PartnerControls">
+  <documentManagement/>
+</p:properties>
+</file>
+
+<file path=customXml/item2.xml><?xml version="1.0" encoding="utf-8"?>
 <ct:contentTypeSchema xmlns:ct="http://schemas.microsoft.com/office/2006/metadata/contentType" xmlns:ma="http://schemas.microsoft.com/office/2006/metadata/properties/metaAttributes" ct:_="" ma:_="" ma:contentTypeName="Document" ma:contentTypeID="0x0101005533C2B91052194093CA2A0C3BFA0481" ma:contentTypeVersion="9" ma:contentTypeDescription="Create a new document." ma:contentTypeScope="" ma:versionID="58d75eb495fa982fd2315ad4155ad7b7">
   <xsd:schema xmlns:xsd="http://www.w3.org/2001/XMLSchema" xmlns:xs="http://www.w3.org/2001/XMLSchema" xmlns:p="http://schemas.microsoft.com/office/2006/metadata/properties" xmlns:ns3="e8614b1b-e982-4674-b1d6-f108a4c63f12" xmlns:ns4="79eca6e9-6ae5-4cc3-b53c-5cf7374c7c53" targetNamespace="http://schemas.microsoft.com/office/2006/metadata/properties" ma:root="true" ma:fieldsID="3e80a00600d34704d5fddc29600890df" ns3:_="" ns4:_="">
     <xsd:import namespace="e8614b1b-e982-4674-b1d6-f108a4c63f12"/>
@@ -28754,12 +28762,6 @@
 </ct:contentTypeSchema>
 </file>
 
-<file path=customXml/item2.xml><?xml version="1.0" encoding="utf-8"?>
-<p:properties xmlns:p="http://schemas.microsoft.com/office/2006/metadata/properties" xmlns:xsi="http://www.w3.org/2001/XMLSchema-instance" xmlns:pc="http://schemas.microsoft.com/office/infopath/2007/PartnerControls">
-  <documentManagement/>
-</p:properties>
-</file>
-
 <file path=customXml/item3.xml><?xml version="1.0" encoding="utf-8"?>
 <?mso-contentType ?>
 <FormTemplates xmlns="http://schemas.microsoft.com/sharepoint/v3/contenttype/forms">
@@ -28770,6 +28772,23 @@
 </file>
 
 <file path=customXml/itemProps1.xml><?xml version="1.0" encoding="utf-8"?>
+<ds:datastoreItem xmlns:ds="http://schemas.openxmlformats.org/officeDocument/2006/customXml" ds:itemID="{A38E08DD-D536-44A6-BB2D-D38E76347644}">
+  <ds:schemaRefs>
+    <ds:schemaRef ds:uri="http://www.w3.org/XML/1998/namespace"/>
+    <ds:schemaRef ds:uri="http://schemas.microsoft.com/office/2006/documentManagement/types"/>
+    <ds:schemaRef ds:uri="http://purl.org/dc/dcmitype/"/>
+    <ds:schemaRef ds:uri="http://purl.org/dc/terms/"/>
+    <ds:schemaRef ds:uri="e8614b1b-e982-4674-b1d6-f108a4c63f12"/>
+    <ds:schemaRef ds:uri="http://schemas.openxmlformats.org/package/2006/metadata/core-properties"/>
+    <ds:schemaRef ds:uri="79eca6e9-6ae5-4cc3-b53c-5cf7374c7c53"/>
+    <ds:schemaRef ds:uri="http://schemas.microsoft.com/office/infopath/2007/PartnerControls"/>
+    <ds:schemaRef ds:uri="http://schemas.microsoft.com/office/2006/metadata/properties"/>
+    <ds:schemaRef ds:uri="http://purl.org/dc/elements/1.1/"/>
+  </ds:schemaRefs>
+</ds:datastoreItem>
+</file>
+
+<file path=customXml/itemProps2.xml><?xml version="1.0" encoding="utf-8"?>
 <ds:datastoreItem xmlns:ds="http://schemas.openxmlformats.org/officeDocument/2006/customXml" ds:itemID="{6F387933-6052-4AC5-BD1B-4E5DB404DCE7}">
   <ds:schemaRefs>
     <ds:schemaRef ds:uri="http://schemas.microsoft.com/office/2006/metadata/contentType"/>
@@ -28788,23 +28807,6 @@
 </ds:datastoreItem>
 </file>
 
-<file path=customXml/itemProps2.xml><?xml version="1.0" encoding="utf-8"?>
-<ds:datastoreItem xmlns:ds="http://schemas.openxmlformats.org/officeDocument/2006/customXml" ds:itemID="{A38E08DD-D536-44A6-BB2D-D38E76347644}">
-  <ds:schemaRefs>
-    <ds:schemaRef ds:uri="http://www.w3.org/XML/1998/namespace"/>
-    <ds:schemaRef ds:uri="http://schemas.microsoft.com/office/2006/documentManagement/types"/>
-    <ds:schemaRef ds:uri="http://purl.org/dc/dcmitype/"/>
-    <ds:schemaRef ds:uri="http://purl.org/dc/terms/"/>
-    <ds:schemaRef ds:uri="e8614b1b-e982-4674-b1d6-f108a4c63f12"/>
-    <ds:schemaRef ds:uri="http://schemas.openxmlformats.org/package/2006/metadata/core-properties"/>
-    <ds:schemaRef ds:uri="79eca6e9-6ae5-4cc3-b53c-5cf7374c7c53"/>
-    <ds:schemaRef ds:uri="http://schemas.microsoft.com/office/infopath/2007/PartnerControls"/>
-    <ds:schemaRef ds:uri="http://schemas.microsoft.com/office/2006/metadata/properties"/>
-    <ds:schemaRef ds:uri="http://purl.org/dc/elements/1.1/"/>
-  </ds:schemaRefs>
-</ds:datastoreItem>
-</file>
-
 <file path=customXml/itemProps3.xml><?xml version="1.0" encoding="utf-8"?>
 <ds:datastoreItem xmlns:ds="http://schemas.openxmlformats.org/officeDocument/2006/customXml" ds:itemID="{3E6A6553-98D7-476C-AEEA-FE3743E2662C}">
   <ds:schemaRefs>

</xml_diff>